<commit_message>
Updated the documentation to include more theory about single crystals and to include incoherence.
</commit_message>
<xml_diff>
--- a/Sphinx/SingleCrystalGeometry.pptx
+++ b/Sphinx/SingleCrystalGeometry.pptx
@@ -8,6 +8,7 @@
     <p:sldId id="256" r:id="rId2"/>
     <p:sldId id="257" r:id="rId3"/>
     <p:sldId id="258" r:id="rId4"/>
+    <p:sldId id="259" r:id="rId5"/>
   </p:sldIdLst>
   <p:sldSz cx="12192000" cy="6858000"/>
   <p:notesSz cx="6858000" cy="9945688"/>
@@ -263,7 +264,7 @@
           <a:p>
             <a:fld id="{18C8C4B9-DDC0-4E58-82E3-7C78202F16A3}" type="datetimeFigureOut">
               <a:rPr lang="en-GB" smtClean="0"/>
-              <a:t>21/06/2021</a:t>
+              <a:t>29/07/2023</a:t>
             </a:fld>
             <a:endParaRPr lang="en-GB"/>
           </a:p>
@@ -463,7 +464,7 @@
           <a:p>
             <a:fld id="{18C8C4B9-DDC0-4E58-82E3-7C78202F16A3}" type="datetimeFigureOut">
               <a:rPr lang="en-GB" smtClean="0"/>
-              <a:t>21/06/2021</a:t>
+              <a:t>29/07/2023</a:t>
             </a:fld>
             <a:endParaRPr lang="en-GB"/>
           </a:p>
@@ -673,7 +674,7 @@
           <a:p>
             <a:fld id="{18C8C4B9-DDC0-4E58-82E3-7C78202F16A3}" type="datetimeFigureOut">
               <a:rPr lang="en-GB" smtClean="0"/>
-              <a:t>21/06/2021</a:t>
+              <a:t>29/07/2023</a:t>
             </a:fld>
             <a:endParaRPr lang="en-GB"/>
           </a:p>
@@ -873,7 +874,7 @@
           <a:p>
             <a:fld id="{18C8C4B9-DDC0-4E58-82E3-7C78202F16A3}" type="datetimeFigureOut">
               <a:rPr lang="en-GB" smtClean="0"/>
-              <a:t>21/06/2021</a:t>
+              <a:t>29/07/2023</a:t>
             </a:fld>
             <a:endParaRPr lang="en-GB"/>
           </a:p>
@@ -1149,7 +1150,7 @@
           <a:p>
             <a:fld id="{18C8C4B9-DDC0-4E58-82E3-7C78202F16A3}" type="datetimeFigureOut">
               <a:rPr lang="en-GB" smtClean="0"/>
-              <a:t>21/06/2021</a:t>
+              <a:t>29/07/2023</a:t>
             </a:fld>
             <a:endParaRPr lang="en-GB"/>
           </a:p>
@@ -1417,7 +1418,7 @@
           <a:p>
             <a:fld id="{18C8C4B9-DDC0-4E58-82E3-7C78202F16A3}" type="datetimeFigureOut">
               <a:rPr lang="en-GB" smtClean="0"/>
-              <a:t>21/06/2021</a:t>
+              <a:t>29/07/2023</a:t>
             </a:fld>
             <a:endParaRPr lang="en-GB"/>
           </a:p>
@@ -1832,7 +1833,7 @@
           <a:p>
             <a:fld id="{18C8C4B9-DDC0-4E58-82E3-7C78202F16A3}" type="datetimeFigureOut">
               <a:rPr lang="en-GB" smtClean="0"/>
-              <a:t>21/06/2021</a:t>
+              <a:t>29/07/2023</a:t>
             </a:fld>
             <a:endParaRPr lang="en-GB"/>
           </a:p>
@@ -1974,7 +1975,7 @@
           <a:p>
             <a:fld id="{18C8C4B9-DDC0-4E58-82E3-7C78202F16A3}" type="datetimeFigureOut">
               <a:rPr lang="en-GB" smtClean="0"/>
-              <a:t>21/06/2021</a:t>
+              <a:t>29/07/2023</a:t>
             </a:fld>
             <a:endParaRPr lang="en-GB"/>
           </a:p>
@@ -2087,7 +2088,7 @@
           <a:p>
             <a:fld id="{18C8C4B9-DDC0-4E58-82E3-7C78202F16A3}" type="datetimeFigureOut">
               <a:rPr lang="en-GB" smtClean="0"/>
-              <a:t>21/06/2021</a:t>
+              <a:t>29/07/2023</a:t>
             </a:fld>
             <a:endParaRPr lang="en-GB"/>
           </a:p>
@@ -2400,7 +2401,7 @@
           <a:p>
             <a:fld id="{18C8C4B9-DDC0-4E58-82E3-7C78202F16A3}" type="datetimeFigureOut">
               <a:rPr lang="en-GB" smtClean="0"/>
-              <a:t>21/06/2021</a:t>
+              <a:t>29/07/2023</a:t>
             </a:fld>
             <a:endParaRPr lang="en-GB"/>
           </a:p>
@@ -2689,7 +2690,7 @@
           <a:p>
             <a:fld id="{18C8C4B9-DDC0-4E58-82E3-7C78202F16A3}" type="datetimeFigureOut">
               <a:rPr lang="en-GB" smtClean="0"/>
-              <a:t>21/06/2021</a:t>
+              <a:t>29/07/2023</a:t>
             </a:fld>
             <a:endParaRPr lang="en-GB"/>
           </a:p>
@@ -2932,7 +2933,7 @@
           <a:p>
             <a:fld id="{18C8C4B9-DDC0-4E58-82E3-7C78202F16A3}" type="datetimeFigureOut">
               <a:rPr lang="en-GB" smtClean="0"/>
-              <a:t>21/06/2021</a:t>
+              <a:t>29/07/2023</a:t>
             </a:fld>
             <a:endParaRPr lang="en-GB"/>
           </a:p>
@@ -6375,6 +6376,1210 @@
 </p:sld>
 </file>
 
+<file path=ppt/slides/slide4.xml><?xml version="1.0" encoding="utf-8"?>
+<p:sld xmlns:a="http://schemas.openxmlformats.org/drawingml/2006/main" xmlns:r="http://schemas.openxmlformats.org/officeDocument/2006/relationships" xmlns:p="http://schemas.openxmlformats.org/presentationml/2006/main">
+  <p:cSld>
+    <p:spTree>
+      <p:nvGrpSpPr>
+        <p:cNvPr id="1" name=""/>
+        <p:cNvGrpSpPr/>
+        <p:nvPr/>
+      </p:nvGrpSpPr>
+      <p:grpSpPr>
+        <a:xfrm>
+          <a:off x="0" y="0"/>
+          <a:ext cx="0" cy="0"/>
+          <a:chOff x="0" y="0"/>
+          <a:chExt cx="0" cy="0"/>
+        </a:xfrm>
+      </p:grpSpPr>
+      <p:sp>
+        <p:nvSpPr>
+          <p:cNvPr id="46" name="Rectangle 45">
+            <a:extLst>
+              <a:ext uri="{FF2B5EF4-FFF2-40B4-BE49-F238E27FC236}">
+                <a16:creationId xmlns:a16="http://schemas.microsoft.com/office/drawing/2014/main" id="{A064D958-50B0-E1EB-36EC-5ECC266439CD}"/>
+              </a:ext>
+            </a:extLst>
+          </p:cNvPr>
+          <p:cNvSpPr/>
+          <p:nvPr/>
+        </p:nvSpPr>
+        <p:spPr>
+          <a:xfrm>
+            <a:off x="7184209" y="1553889"/>
+            <a:ext cx="2627113" cy="4081657"/>
+          </a:xfrm>
+          <a:prstGeom prst="rect">
+            <a:avLst/>
+          </a:prstGeom>
+          <a:gradFill flip="none" rotWithShape="1">
+            <a:gsLst>
+              <a:gs pos="0">
+                <a:schemeClr val="accent4">
+                  <a:lumMod val="5000"/>
+                  <a:lumOff val="95000"/>
+                </a:schemeClr>
+              </a:gs>
+              <a:gs pos="74000">
+                <a:schemeClr val="accent4">
+                  <a:lumMod val="45000"/>
+                  <a:lumOff val="55000"/>
+                </a:schemeClr>
+              </a:gs>
+              <a:gs pos="83000">
+                <a:schemeClr val="accent4">
+                  <a:lumMod val="45000"/>
+                  <a:lumOff val="55000"/>
+                </a:schemeClr>
+              </a:gs>
+              <a:gs pos="100000">
+                <a:schemeClr val="accent4">
+                  <a:lumMod val="30000"/>
+                  <a:lumOff val="70000"/>
+                </a:schemeClr>
+              </a:gs>
+            </a:gsLst>
+            <a:lin ang="10800000" scaled="1"/>
+            <a:tileRect/>
+          </a:gradFill>
+          <a:ln>
+            <a:noFill/>
+          </a:ln>
+        </p:spPr>
+        <p:style>
+          <a:lnRef idx="2">
+            <a:schemeClr val="accent1">
+              <a:shade val="15000"/>
+            </a:schemeClr>
+          </a:lnRef>
+          <a:fillRef idx="1">
+            <a:schemeClr val="accent1"/>
+          </a:fillRef>
+          <a:effectRef idx="0">
+            <a:schemeClr val="accent1"/>
+          </a:effectRef>
+          <a:fontRef idx="minor">
+            <a:schemeClr val="lt1"/>
+          </a:fontRef>
+        </p:style>
+        <p:txBody>
+          <a:bodyPr rtlCol="0" anchor="ctr"/>
+          <a:lstStyle/>
+          <a:p>
+            <a:pPr algn="ctr"/>
+            <a:endParaRPr lang="en-GB"/>
+          </a:p>
+        </p:txBody>
+      </p:sp>
+      <p:sp>
+        <p:nvSpPr>
+          <p:cNvPr id="45" name="Rectangle 44">
+            <a:extLst>
+              <a:ext uri="{FF2B5EF4-FFF2-40B4-BE49-F238E27FC236}">
+                <a16:creationId xmlns:a16="http://schemas.microsoft.com/office/drawing/2014/main" id="{E3BE91DA-5A98-FE13-B14A-2325C773592B}"/>
+              </a:ext>
+            </a:extLst>
+          </p:cNvPr>
+          <p:cNvSpPr/>
+          <p:nvPr/>
+        </p:nvSpPr>
+        <p:spPr>
+          <a:xfrm>
+            <a:off x="2074463" y="1542197"/>
+            <a:ext cx="2627113" cy="4081657"/>
+          </a:xfrm>
+          <a:prstGeom prst="rect">
+            <a:avLst/>
+          </a:prstGeom>
+          <a:gradFill flip="none" rotWithShape="1">
+            <a:gsLst>
+              <a:gs pos="0">
+                <a:schemeClr val="accent1">
+                  <a:lumMod val="5000"/>
+                  <a:lumOff val="95000"/>
+                </a:schemeClr>
+              </a:gs>
+              <a:gs pos="74000">
+                <a:schemeClr val="accent1">
+                  <a:lumMod val="45000"/>
+                  <a:lumOff val="55000"/>
+                </a:schemeClr>
+              </a:gs>
+              <a:gs pos="83000">
+                <a:schemeClr val="accent1">
+                  <a:lumMod val="45000"/>
+                  <a:lumOff val="55000"/>
+                </a:schemeClr>
+              </a:gs>
+              <a:gs pos="100000">
+                <a:schemeClr val="accent1">
+                  <a:lumMod val="30000"/>
+                  <a:lumOff val="70000"/>
+                </a:schemeClr>
+              </a:gs>
+            </a:gsLst>
+            <a:lin ang="0" scaled="1"/>
+            <a:tileRect/>
+          </a:gradFill>
+          <a:ln>
+            <a:noFill/>
+          </a:ln>
+        </p:spPr>
+        <p:style>
+          <a:lnRef idx="2">
+            <a:schemeClr val="accent1">
+              <a:shade val="15000"/>
+            </a:schemeClr>
+          </a:lnRef>
+          <a:fillRef idx="1">
+            <a:schemeClr val="accent1"/>
+          </a:fillRef>
+          <a:effectRef idx="0">
+            <a:schemeClr val="accent1"/>
+          </a:effectRef>
+          <a:fontRef idx="minor">
+            <a:schemeClr val="lt1"/>
+          </a:fontRef>
+        </p:style>
+        <p:txBody>
+          <a:bodyPr rtlCol="0" anchor="ctr"/>
+          <a:lstStyle/>
+          <a:p>
+            <a:pPr algn="ctr"/>
+            <a:endParaRPr lang="en-GB"/>
+          </a:p>
+        </p:txBody>
+      </p:sp>
+      <p:sp>
+        <p:nvSpPr>
+          <p:cNvPr id="27" name="Rectangle 26">
+            <a:extLst>
+              <a:ext uri="{FF2B5EF4-FFF2-40B4-BE49-F238E27FC236}">
+                <a16:creationId xmlns:a16="http://schemas.microsoft.com/office/drawing/2014/main" id="{B0267F43-3115-16CD-FE3F-48843AFC93EB}"/>
+              </a:ext>
+            </a:extLst>
+          </p:cNvPr>
+          <p:cNvSpPr/>
+          <p:nvPr/>
+        </p:nvSpPr>
+        <p:spPr>
+          <a:xfrm>
+            <a:off x="4717417" y="1542197"/>
+            <a:ext cx="2460170" cy="4081657"/>
+          </a:xfrm>
+          <a:prstGeom prst="rect">
+            <a:avLst/>
+          </a:prstGeom>
+          <a:solidFill>
+            <a:srgbClr val="00B0F0"/>
+          </a:solidFill>
+          <a:ln>
+            <a:noFill/>
+          </a:ln>
+        </p:spPr>
+        <p:style>
+          <a:lnRef idx="2">
+            <a:schemeClr val="accent1">
+              <a:shade val="15000"/>
+            </a:schemeClr>
+          </a:lnRef>
+          <a:fillRef idx="1">
+            <a:schemeClr val="accent1"/>
+          </a:fillRef>
+          <a:effectRef idx="0">
+            <a:schemeClr val="accent1"/>
+          </a:effectRef>
+          <a:fontRef idx="minor">
+            <a:schemeClr val="lt1"/>
+          </a:fontRef>
+        </p:style>
+        <p:txBody>
+          <a:bodyPr rtlCol="0" anchor="ctr"/>
+          <a:lstStyle/>
+          <a:p>
+            <a:pPr algn="ctr"/>
+            <a:endParaRPr lang="en-GB" sz="3200" dirty="0"/>
+          </a:p>
+        </p:txBody>
+      </p:sp>
+      <p:cxnSp>
+        <p:nvCxnSpPr>
+          <p:cNvPr id="4" name="Straight Connector 3">
+            <a:extLst>
+              <a:ext uri="{FF2B5EF4-FFF2-40B4-BE49-F238E27FC236}">
+                <a16:creationId xmlns:a16="http://schemas.microsoft.com/office/drawing/2014/main" id="{DA932656-EE33-2790-472C-2248AA5EA454}"/>
+              </a:ext>
+            </a:extLst>
+          </p:cNvPr>
+          <p:cNvCxnSpPr>
+            <a:cxnSpLocks/>
+          </p:cNvCxnSpPr>
+          <p:nvPr/>
+        </p:nvCxnSpPr>
+        <p:spPr>
+          <a:xfrm flipH="1">
+            <a:off x="4717417" y="1553889"/>
+            <a:ext cx="6622" cy="4069966"/>
+          </a:xfrm>
+          <a:prstGeom prst="line">
+            <a:avLst/>
+          </a:prstGeom>
+          <a:ln w="50800"/>
+        </p:spPr>
+        <p:style>
+          <a:lnRef idx="3">
+            <a:schemeClr val="dk1"/>
+          </a:lnRef>
+          <a:fillRef idx="0">
+            <a:schemeClr val="dk1"/>
+          </a:fillRef>
+          <a:effectRef idx="2">
+            <a:schemeClr val="dk1"/>
+          </a:effectRef>
+          <a:fontRef idx="minor">
+            <a:schemeClr val="tx1"/>
+          </a:fontRef>
+        </p:style>
+      </p:cxnSp>
+      <p:cxnSp>
+        <p:nvCxnSpPr>
+          <p:cNvPr id="6" name="Straight Connector 5">
+            <a:extLst>
+              <a:ext uri="{FF2B5EF4-FFF2-40B4-BE49-F238E27FC236}">
+                <a16:creationId xmlns:a16="http://schemas.microsoft.com/office/drawing/2014/main" id="{E1143595-44BD-B3F9-1C19-16326A3E2B1B}"/>
+              </a:ext>
+            </a:extLst>
+          </p:cNvPr>
+          <p:cNvCxnSpPr>
+            <a:cxnSpLocks/>
+          </p:cNvCxnSpPr>
+          <p:nvPr/>
+        </p:nvCxnSpPr>
+        <p:spPr>
+          <a:xfrm flipH="1">
+            <a:off x="7177589" y="1542197"/>
+            <a:ext cx="6620" cy="4081657"/>
+          </a:xfrm>
+          <a:prstGeom prst="line">
+            <a:avLst/>
+          </a:prstGeom>
+          <a:ln w="50800"/>
+        </p:spPr>
+        <p:style>
+          <a:lnRef idx="3">
+            <a:schemeClr val="dk1"/>
+          </a:lnRef>
+          <a:fillRef idx="0">
+            <a:schemeClr val="dk1"/>
+          </a:fillRef>
+          <a:effectRef idx="2">
+            <a:schemeClr val="dk1"/>
+          </a:effectRef>
+          <a:fontRef idx="minor">
+            <a:schemeClr val="tx1"/>
+          </a:fontRef>
+        </p:style>
+      </p:cxnSp>
+      <p:cxnSp>
+        <p:nvCxnSpPr>
+          <p:cNvPr id="10" name="Straight Connector 9">
+            <a:extLst>
+              <a:ext uri="{FF2B5EF4-FFF2-40B4-BE49-F238E27FC236}">
+                <a16:creationId xmlns:a16="http://schemas.microsoft.com/office/drawing/2014/main" id="{9D1BD05F-98F4-4D7D-6032-352A365C9927}"/>
+              </a:ext>
+            </a:extLst>
+          </p:cNvPr>
+          <p:cNvCxnSpPr/>
+          <p:nvPr/>
+        </p:nvCxnSpPr>
+        <p:spPr>
+          <a:xfrm flipH="1">
+            <a:off x="3002510" y="4421875"/>
+            <a:ext cx="1714907" cy="0"/>
+          </a:xfrm>
+          <a:prstGeom prst="line">
+            <a:avLst/>
+          </a:prstGeom>
+          <a:ln w="9525" cap="flat" cmpd="sng" algn="ctr">
+            <a:solidFill>
+              <a:schemeClr val="dk1"/>
+            </a:solidFill>
+            <a:prstDash val="dash"/>
+            <a:round/>
+            <a:headEnd type="none" w="med" len="med"/>
+            <a:tailEnd type="none" w="med" len="med"/>
+          </a:ln>
+        </p:spPr>
+        <p:style>
+          <a:lnRef idx="0">
+            <a:scrgbClr r="0" g="0" b="0"/>
+          </a:lnRef>
+          <a:fillRef idx="0">
+            <a:scrgbClr r="0" g="0" b="0"/>
+          </a:fillRef>
+          <a:effectRef idx="0">
+            <a:scrgbClr r="0" g="0" b="0"/>
+          </a:effectRef>
+          <a:fontRef idx="minor">
+            <a:schemeClr val="tx1"/>
+          </a:fontRef>
+        </p:style>
+      </p:cxnSp>
+      <p:cxnSp>
+        <p:nvCxnSpPr>
+          <p:cNvPr id="12" name="Straight Arrow Connector 11">
+            <a:extLst>
+              <a:ext uri="{FF2B5EF4-FFF2-40B4-BE49-F238E27FC236}">
+                <a16:creationId xmlns:a16="http://schemas.microsoft.com/office/drawing/2014/main" id="{CEA0EE32-BD76-F9BC-3925-131B4DAAE696}"/>
+              </a:ext>
+            </a:extLst>
+          </p:cNvPr>
+          <p:cNvCxnSpPr/>
+          <p:nvPr/>
+        </p:nvCxnSpPr>
+        <p:spPr>
+          <a:xfrm flipV="1">
+            <a:off x="3002510" y="4421875"/>
+            <a:ext cx="1687611" cy="1173707"/>
+          </a:xfrm>
+          <a:prstGeom prst="straightConnector1">
+            <a:avLst/>
+          </a:prstGeom>
+          <a:ln w="22225">
+            <a:solidFill>
+              <a:schemeClr val="tx1"/>
+            </a:solidFill>
+            <a:headEnd type="none" w="lg" len="lg"/>
+            <a:tailEnd type="triangle" w="lg" len="lg"/>
+          </a:ln>
+        </p:spPr>
+        <p:style>
+          <a:lnRef idx="1">
+            <a:schemeClr val="accent1"/>
+          </a:lnRef>
+          <a:fillRef idx="0">
+            <a:schemeClr val="accent1"/>
+          </a:fillRef>
+          <a:effectRef idx="0">
+            <a:schemeClr val="accent1"/>
+          </a:effectRef>
+          <a:fontRef idx="minor">
+            <a:schemeClr val="tx1"/>
+          </a:fontRef>
+        </p:style>
+      </p:cxnSp>
+      <p:cxnSp>
+        <p:nvCxnSpPr>
+          <p:cNvPr id="16" name="Straight Connector 15">
+            <a:extLst>
+              <a:ext uri="{FF2B5EF4-FFF2-40B4-BE49-F238E27FC236}">
+                <a16:creationId xmlns:a16="http://schemas.microsoft.com/office/drawing/2014/main" id="{75F5154A-DA2D-5437-A9C4-787B9BBC5D2D}"/>
+              </a:ext>
+            </a:extLst>
+          </p:cNvPr>
+          <p:cNvCxnSpPr>
+            <a:cxnSpLocks/>
+          </p:cNvCxnSpPr>
+          <p:nvPr/>
+        </p:nvCxnSpPr>
+        <p:spPr>
+          <a:xfrm>
+            <a:off x="3002510" y="4421875"/>
+            <a:ext cx="0" cy="1173707"/>
+          </a:xfrm>
+          <a:prstGeom prst="line">
+            <a:avLst/>
+          </a:prstGeom>
+        </p:spPr>
+        <p:style>
+          <a:lnRef idx="1">
+            <a:schemeClr val="accent1"/>
+          </a:lnRef>
+          <a:fillRef idx="0">
+            <a:schemeClr val="accent1"/>
+          </a:fillRef>
+          <a:effectRef idx="0">
+            <a:schemeClr val="accent1"/>
+          </a:effectRef>
+          <a:fontRef idx="minor">
+            <a:schemeClr val="tx1"/>
+          </a:fontRef>
+        </p:style>
+      </p:cxnSp>
+      <p:cxnSp>
+        <p:nvCxnSpPr>
+          <p:cNvPr id="19" name="Straight Connector 18">
+            <a:extLst>
+              <a:ext uri="{FF2B5EF4-FFF2-40B4-BE49-F238E27FC236}">
+                <a16:creationId xmlns:a16="http://schemas.microsoft.com/office/drawing/2014/main" id="{2AD0419E-19A8-B1FC-4C67-7A6BEE0F1867}"/>
+              </a:ext>
+            </a:extLst>
+          </p:cNvPr>
+          <p:cNvCxnSpPr>
+            <a:cxnSpLocks/>
+          </p:cNvCxnSpPr>
+          <p:nvPr/>
+        </p:nvCxnSpPr>
+        <p:spPr>
+          <a:xfrm>
+            <a:off x="3004782" y="3264091"/>
+            <a:ext cx="0" cy="1173707"/>
+          </a:xfrm>
+          <a:prstGeom prst="line">
+            <a:avLst/>
+          </a:prstGeom>
+        </p:spPr>
+        <p:style>
+          <a:lnRef idx="1">
+            <a:schemeClr val="accent1"/>
+          </a:lnRef>
+          <a:fillRef idx="0">
+            <a:schemeClr val="accent1"/>
+          </a:fillRef>
+          <a:effectRef idx="0">
+            <a:schemeClr val="accent1"/>
+          </a:effectRef>
+          <a:fontRef idx="minor">
+            <a:schemeClr val="tx1"/>
+          </a:fontRef>
+        </p:style>
+      </p:cxnSp>
+      <p:cxnSp>
+        <p:nvCxnSpPr>
+          <p:cNvPr id="20" name="Straight Arrow Connector 19">
+            <a:extLst>
+              <a:ext uri="{FF2B5EF4-FFF2-40B4-BE49-F238E27FC236}">
+                <a16:creationId xmlns:a16="http://schemas.microsoft.com/office/drawing/2014/main" id="{FABD751B-AB18-5796-7F4F-FC68CDEDC6CB}"/>
+              </a:ext>
+            </a:extLst>
+          </p:cNvPr>
+          <p:cNvCxnSpPr>
+            <a:cxnSpLocks/>
+          </p:cNvCxnSpPr>
+          <p:nvPr/>
+        </p:nvCxnSpPr>
+        <p:spPr>
+          <a:xfrm flipH="1" flipV="1">
+            <a:off x="3000239" y="3264091"/>
+            <a:ext cx="1685580" cy="1173706"/>
+          </a:xfrm>
+          <a:prstGeom prst="straightConnector1">
+            <a:avLst/>
+          </a:prstGeom>
+          <a:ln w="22225">
+            <a:solidFill>
+              <a:srgbClr val="00B050"/>
+            </a:solidFill>
+            <a:headEnd type="none" w="lg" len="lg"/>
+            <a:tailEnd type="triangle" w="lg" len="lg"/>
+          </a:ln>
+        </p:spPr>
+        <p:style>
+          <a:lnRef idx="1">
+            <a:schemeClr val="accent1"/>
+          </a:lnRef>
+          <a:fillRef idx="0">
+            <a:schemeClr val="accent1"/>
+          </a:fillRef>
+          <a:effectRef idx="0">
+            <a:schemeClr val="accent1"/>
+          </a:effectRef>
+          <a:fontRef idx="minor">
+            <a:schemeClr val="tx1"/>
+          </a:fontRef>
+        </p:style>
+      </p:cxnSp>
+      <p:sp>
+        <p:nvSpPr>
+          <p:cNvPr id="22" name="TextBox 21">
+            <a:extLst>
+              <a:ext uri="{FF2B5EF4-FFF2-40B4-BE49-F238E27FC236}">
+                <a16:creationId xmlns:a16="http://schemas.microsoft.com/office/drawing/2014/main" id="{60BA1EEA-D810-280C-A684-92004F3B2235}"/>
+              </a:ext>
+            </a:extLst>
+          </p:cNvPr>
+          <p:cNvSpPr txBox="1"/>
+          <p:nvPr/>
+        </p:nvSpPr>
+        <p:spPr>
+          <a:xfrm>
+            <a:off x="3526797" y="5238858"/>
+            <a:ext cx="364202" cy="369332"/>
+          </a:xfrm>
+          <a:prstGeom prst="rect">
+            <a:avLst/>
+          </a:prstGeom>
+          <a:noFill/>
+        </p:spPr>
+        <p:txBody>
+          <a:bodyPr wrap="none" rtlCol="0">
+            <a:spAutoFit/>
+          </a:bodyPr>
+          <a:lstStyle/>
+          <a:p>
+            <a:r>
+              <a:rPr lang="en-GB" dirty="0"/>
+              <a:t>In</a:t>
+            </a:r>
+          </a:p>
+        </p:txBody>
+      </p:sp>
+      <p:sp>
+        <p:nvSpPr>
+          <p:cNvPr id="23" name="TextBox 22">
+            <a:extLst>
+              <a:ext uri="{FF2B5EF4-FFF2-40B4-BE49-F238E27FC236}">
+                <a16:creationId xmlns:a16="http://schemas.microsoft.com/office/drawing/2014/main" id="{5F154C4D-27A4-F630-F555-9FC377ABF2E7}"/>
+              </a:ext>
+            </a:extLst>
+          </p:cNvPr>
+          <p:cNvSpPr txBox="1"/>
+          <p:nvPr/>
+        </p:nvSpPr>
+        <p:spPr>
+          <a:xfrm>
+            <a:off x="7455394" y="2691121"/>
+            <a:ext cx="1817036" cy="369332"/>
+          </a:xfrm>
+          <a:prstGeom prst="rect">
+            <a:avLst/>
+          </a:prstGeom>
+          <a:noFill/>
+        </p:spPr>
+        <p:txBody>
+          <a:bodyPr wrap="none" rtlCol="0">
+            <a:spAutoFit/>
+          </a:bodyPr>
+          <a:lstStyle/>
+          <a:p>
+            <a:r>
+              <a:rPr lang="en-GB" dirty="0">
+                <a:solidFill>
+                  <a:srgbClr val="7030A0"/>
+                </a:solidFill>
+              </a:rPr>
+              <a:t>Transmittance (T)</a:t>
+            </a:r>
+          </a:p>
+        </p:txBody>
+      </p:sp>
+      <mc:AlternateContent xmlns:mc="http://schemas.openxmlformats.org/markup-compatibility/2006">
+        <mc:Choice xmlns:a14="http://schemas.microsoft.com/office/drawing/2010/main" Requires="a14">
+          <p:sp>
+            <p:nvSpPr>
+              <p:cNvPr id="24" name="TextBox 23">
+                <a:extLst>
+                  <a:ext uri="{FF2B5EF4-FFF2-40B4-BE49-F238E27FC236}">
+                    <a16:creationId xmlns:a16="http://schemas.microsoft.com/office/drawing/2014/main" id="{75E1E339-0CE3-E182-7659-EE3D71504947}"/>
+                  </a:ext>
+                </a:extLst>
+              </p:cNvPr>
+              <p:cNvSpPr txBox="1"/>
+              <p:nvPr/>
+            </p:nvSpPr>
+            <p:spPr>
+              <a:xfrm>
+                <a:off x="3948384" y="4486069"/>
+                <a:ext cx="189475" cy="276999"/>
+              </a:xfrm>
+              <a:prstGeom prst="rect">
+                <a:avLst/>
+              </a:prstGeom>
+              <a:noFill/>
+            </p:spPr>
+            <p:txBody>
+              <a:bodyPr wrap="none" lIns="0" tIns="0" rIns="0" bIns="0" rtlCol="0">
+                <a:spAutoFit/>
+              </a:bodyPr>
+              <a:lstStyle/>
+              <a:p>
+                <a14:m>
+                  <m:oMathPara xmlns:m="http://schemas.openxmlformats.org/officeDocument/2006/math">
+                    <m:oMathParaPr>
+                      <m:jc m:val="centerGroup"/>
+                    </m:oMathParaPr>
+                    <m:oMath xmlns:m="http://schemas.openxmlformats.org/officeDocument/2006/math">
+                      <m:r>
+                        <a:rPr lang="en-GB" i="1" smtClean="0">
+                          <a:latin typeface="Cambria Math" panose="02040503050406030204" pitchFamily="18" charset="0"/>
+                          <a:ea typeface="Cambria Math" panose="02040503050406030204" pitchFamily="18" charset="0"/>
+                        </a:rPr>
+                        <m:t>𝜃</m:t>
+                      </m:r>
+                    </m:oMath>
+                  </m:oMathPara>
+                </a14:m>
+                <a:endParaRPr lang="en-GB" dirty="0"/>
+              </a:p>
+            </p:txBody>
+          </p:sp>
+        </mc:Choice>
+        <mc:Fallback>
+          <p:sp>
+            <p:nvSpPr>
+              <p:cNvPr id="24" name="TextBox 23">
+                <a:extLst>
+                  <a:ext uri="{FF2B5EF4-FFF2-40B4-BE49-F238E27FC236}">
+                    <a16:creationId xmlns:a16="http://schemas.microsoft.com/office/drawing/2014/main" id="{75E1E339-0CE3-E182-7659-EE3D71504947}"/>
+                  </a:ext>
+                </a:extLst>
+              </p:cNvPr>
+              <p:cNvSpPr txBox="1">
+                <a:spLocks noRot="1" noChangeAspect="1" noMove="1" noResize="1" noEditPoints="1" noAdjustHandles="1" noChangeArrowheads="1" noChangeShapeType="1" noTextEdit="1"/>
+              </p:cNvSpPr>
+              <p:nvPr/>
+            </p:nvSpPr>
+            <p:spPr>
+              <a:xfrm>
+                <a:off x="3948384" y="4486069"/>
+                <a:ext cx="189475" cy="276999"/>
+              </a:xfrm>
+              <a:prstGeom prst="rect">
+                <a:avLst/>
+              </a:prstGeom>
+              <a:blipFill>
+                <a:blip r:embed="rId2"/>
+                <a:stretch>
+                  <a:fillRect l="-32258" r="-22581" b="-6667"/>
+                </a:stretch>
+              </a:blipFill>
+            </p:spPr>
+            <p:txBody>
+              <a:bodyPr/>
+              <a:lstStyle/>
+              <a:p>
+                <a:r>
+                  <a:rPr lang="en-GB">
+                    <a:noFill/>
+                  </a:rPr>
+                  <a:t> </a:t>
+                </a:r>
+              </a:p>
+            </p:txBody>
+          </p:sp>
+        </mc:Fallback>
+      </mc:AlternateContent>
+      <p:sp>
+        <p:nvSpPr>
+          <p:cNvPr id="25" name="TextBox 24">
+            <a:extLst>
+              <a:ext uri="{FF2B5EF4-FFF2-40B4-BE49-F238E27FC236}">
+                <a16:creationId xmlns:a16="http://schemas.microsoft.com/office/drawing/2014/main" id="{4BBB8893-74D3-310C-1A6E-055E4B746060}"/>
+              </a:ext>
+            </a:extLst>
+          </p:cNvPr>
+          <p:cNvSpPr txBox="1"/>
+          <p:nvPr/>
+        </p:nvSpPr>
+        <p:spPr>
+          <a:xfrm>
+            <a:off x="3000239" y="1144682"/>
+            <a:ext cx="1263616" cy="369332"/>
+          </a:xfrm>
+          <a:prstGeom prst="rect">
+            <a:avLst/>
+          </a:prstGeom>
+          <a:noFill/>
+        </p:spPr>
+        <p:txBody>
+          <a:bodyPr wrap="none" rtlCol="0">
+            <a:spAutoFit/>
+          </a:bodyPr>
+          <a:lstStyle/>
+          <a:p>
+            <a:r>
+              <a:rPr lang="en-GB" dirty="0"/>
+              <a:t>Superstrate</a:t>
+            </a:r>
+          </a:p>
+        </p:txBody>
+      </p:sp>
+      <p:sp>
+        <p:nvSpPr>
+          <p:cNvPr id="26" name="TextBox 25">
+            <a:extLst>
+              <a:ext uri="{FF2B5EF4-FFF2-40B4-BE49-F238E27FC236}">
+                <a16:creationId xmlns:a16="http://schemas.microsoft.com/office/drawing/2014/main" id="{1C225569-2FC8-3E0D-302C-446B74416D96}"/>
+              </a:ext>
+            </a:extLst>
+          </p:cNvPr>
+          <p:cNvSpPr txBox="1"/>
+          <p:nvPr/>
+        </p:nvSpPr>
+        <p:spPr>
+          <a:xfrm>
+            <a:off x="7666302" y="1144682"/>
+            <a:ext cx="1070871" cy="369332"/>
+          </a:xfrm>
+          <a:prstGeom prst="rect">
+            <a:avLst/>
+          </a:prstGeom>
+          <a:noFill/>
+        </p:spPr>
+        <p:txBody>
+          <a:bodyPr wrap="none" rtlCol="0">
+            <a:spAutoFit/>
+          </a:bodyPr>
+          <a:lstStyle/>
+          <a:p>
+            <a:r>
+              <a:rPr lang="en-GB" dirty="0"/>
+              <a:t>Substrate</a:t>
+            </a:r>
+          </a:p>
+        </p:txBody>
+      </p:sp>
+      <p:sp>
+        <p:nvSpPr>
+          <p:cNvPr id="28" name="TextBox 27">
+            <a:extLst>
+              <a:ext uri="{FF2B5EF4-FFF2-40B4-BE49-F238E27FC236}">
+                <a16:creationId xmlns:a16="http://schemas.microsoft.com/office/drawing/2014/main" id="{29C8D42F-695F-AD6B-78E7-DE1B6427529C}"/>
+              </a:ext>
+            </a:extLst>
+          </p:cNvPr>
+          <p:cNvSpPr txBox="1"/>
+          <p:nvPr/>
+        </p:nvSpPr>
+        <p:spPr>
+          <a:xfrm>
+            <a:off x="5408212" y="1144682"/>
+            <a:ext cx="1069524" cy="369332"/>
+          </a:xfrm>
+          <a:prstGeom prst="rect">
+            <a:avLst/>
+          </a:prstGeom>
+          <a:noFill/>
+        </p:spPr>
+        <p:txBody>
+          <a:bodyPr wrap="none" rtlCol="0">
+            <a:spAutoFit/>
+          </a:bodyPr>
+          <a:lstStyle/>
+          <a:p>
+            <a:r>
+              <a:rPr lang="en-GB" dirty="0"/>
+              <a:t>Dielectric</a:t>
+            </a:r>
+          </a:p>
+        </p:txBody>
+      </p:sp>
+      <p:cxnSp>
+        <p:nvCxnSpPr>
+          <p:cNvPr id="29" name="Straight Arrow Connector 28">
+            <a:extLst>
+              <a:ext uri="{FF2B5EF4-FFF2-40B4-BE49-F238E27FC236}">
+                <a16:creationId xmlns:a16="http://schemas.microsoft.com/office/drawing/2014/main" id="{3DCB6619-BF28-2717-AF12-FF0800DFE0D3}"/>
+              </a:ext>
+            </a:extLst>
+          </p:cNvPr>
+          <p:cNvCxnSpPr>
+            <a:cxnSpLocks/>
+            <a:endCxn id="27" idx="3"/>
+          </p:cNvCxnSpPr>
+          <p:nvPr/>
+        </p:nvCxnSpPr>
+        <p:spPr>
+          <a:xfrm flipV="1">
+            <a:off x="4708361" y="3583026"/>
+            <a:ext cx="2469226" cy="836664"/>
+          </a:xfrm>
+          <a:prstGeom prst="straightConnector1">
+            <a:avLst/>
+          </a:prstGeom>
+          <a:ln w="22225">
+            <a:solidFill>
+              <a:srgbClr val="FF0000"/>
+            </a:solidFill>
+            <a:headEnd type="none" w="lg" len="lg"/>
+            <a:tailEnd type="triangle" w="lg" len="lg"/>
+          </a:ln>
+        </p:spPr>
+        <p:style>
+          <a:lnRef idx="1">
+            <a:schemeClr val="accent1"/>
+          </a:lnRef>
+          <a:fillRef idx="0">
+            <a:schemeClr val="accent1"/>
+          </a:fillRef>
+          <a:effectRef idx="0">
+            <a:schemeClr val="accent1"/>
+          </a:effectRef>
+          <a:fontRef idx="minor">
+            <a:schemeClr val="tx1"/>
+          </a:fontRef>
+        </p:style>
+      </p:cxnSp>
+      <p:cxnSp>
+        <p:nvCxnSpPr>
+          <p:cNvPr id="31" name="Straight Arrow Connector 30">
+            <a:extLst>
+              <a:ext uri="{FF2B5EF4-FFF2-40B4-BE49-F238E27FC236}">
+                <a16:creationId xmlns:a16="http://schemas.microsoft.com/office/drawing/2014/main" id="{6A729513-B619-3451-B1A1-AC227B8868F4}"/>
+              </a:ext>
+            </a:extLst>
+          </p:cNvPr>
+          <p:cNvCxnSpPr>
+            <a:cxnSpLocks/>
+          </p:cNvCxnSpPr>
+          <p:nvPr/>
+        </p:nvCxnSpPr>
+        <p:spPr>
+          <a:xfrm flipH="1" flipV="1">
+            <a:off x="4708361" y="3264091"/>
+            <a:ext cx="2496522" cy="573205"/>
+          </a:xfrm>
+          <a:prstGeom prst="straightConnector1">
+            <a:avLst/>
+          </a:prstGeom>
+          <a:ln w="22225">
+            <a:solidFill>
+              <a:srgbClr val="FF0000"/>
+            </a:solidFill>
+            <a:headEnd type="none" w="lg" len="lg"/>
+            <a:tailEnd type="triangle" w="lg" len="lg"/>
+          </a:ln>
+        </p:spPr>
+        <p:style>
+          <a:lnRef idx="1">
+            <a:schemeClr val="accent1"/>
+          </a:lnRef>
+          <a:fillRef idx="0">
+            <a:schemeClr val="accent1"/>
+          </a:fillRef>
+          <a:effectRef idx="0">
+            <a:schemeClr val="accent1"/>
+          </a:effectRef>
+          <a:fontRef idx="minor">
+            <a:schemeClr val="tx1"/>
+          </a:fontRef>
+        </p:style>
+      </p:cxnSp>
+      <p:cxnSp>
+        <p:nvCxnSpPr>
+          <p:cNvPr id="32" name="Straight Connector 31">
+            <a:extLst>
+              <a:ext uri="{FF2B5EF4-FFF2-40B4-BE49-F238E27FC236}">
+                <a16:creationId xmlns:a16="http://schemas.microsoft.com/office/drawing/2014/main" id="{0300506A-32DF-54D9-1B60-FF98B7F270FA}"/>
+              </a:ext>
+            </a:extLst>
+          </p:cNvPr>
+          <p:cNvCxnSpPr/>
+          <p:nvPr/>
+        </p:nvCxnSpPr>
+        <p:spPr>
+          <a:xfrm flipH="1">
+            <a:off x="5489976" y="3850944"/>
+            <a:ext cx="1714907" cy="0"/>
+          </a:xfrm>
+          <a:prstGeom prst="line">
+            <a:avLst/>
+          </a:prstGeom>
+          <a:ln w="9525" cap="flat" cmpd="sng" algn="ctr">
+            <a:solidFill>
+              <a:schemeClr val="dk1"/>
+            </a:solidFill>
+            <a:prstDash val="dash"/>
+            <a:round/>
+            <a:headEnd type="none" w="med" len="med"/>
+            <a:tailEnd type="none" w="med" len="med"/>
+          </a:ln>
+        </p:spPr>
+        <p:style>
+          <a:lnRef idx="0">
+            <a:scrgbClr r="0" g="0" b="0"/>
+          </a:lnRef>
+          <a:fillRef idx="0">
+            <a:scrgbClr r="0" g="0" b="0"/>
+          </a:fillRef>
+          <a:effectRef idx="0">
+            <a:scrgbClr r="0" g="0" b="0"/>
+          </a:effectRef>
+          <a:fontRef idx="minor">
+            <a:schemeClr val="tx1"/>
+          </a:fontRef>
+        </p:style>
+      </p:cxnSp>
+      <p:cxnSp>
+        <p:nvCxnSpPr>
+          <p:cNvPr id="37" name="Straight Arrow Connector 36">
+            <a:extLst>
+              <a:ext uri="{FF2B5EF4-FFF2-40B4-BE49-F238E27FC236}">
+                <a16:creationId xmlns:a16="http://schemas.microsoft.com/office/drawing/2014/main" id="{6356B055-8EB1-7DA0-B9DA-BECC2522AFD3}"/>
+              </a:ext>
+            </a:extLst>
+          </p:cNvPr>
+          <p:cNvCxnSpPr>
+            <a:cxnSpLocks/>
+          </p:cNvCxnSpPr>
+          <p:nvPr/>
+        </p:nvCxnSpPr>
+        <p:spPr>
+          <a:xfrm flipV="1">
+            <a:off x="7204883" y="3061324"/>
+            <a:ext cx="1993710" cy="789620"/>
+          </a:xfrm>
+          <a:prstGeom prst="straightConnector1">
+            <a:avLst/>
+          </a:prstGeom>
+          <a:ln w="22225">
+            <a:solidFill>
+              <a:srgbClr val="7030A0"/>
+            </a:solidFill>
+            <a:headEnd type="none" w="lg" len="lg"/>
+            <a:tailEnd type="triangle" w="lg" len="lg"/>
+          </a:ln>
+        </p:spPr>
+        <p:style>
+          <a:lnRef idx="1">
+            <a:schemeClr val="accent1"/>
+          </a:lnRef>
+          <a:fillRef idx="0">
+            <a:schemeClr val="accent1"/>
+          </a:fillRef>
+          <a:effectRef idx="0">
+            <a:schemeClr val="accent1"/>
+          </a:effectRef>
+          <a:fontRef idx="minor">
+            <a:schemeClr val="tx1"/>
+          </a:fontRef>
+        </p:style>
+      </p:cxnSp>
+      <p:cxnSp>
+        <p:nvCxnSpPr>
+          <p:cNvPr id="39" name="Straight Arrow Connector 38">
+            <a:extLst>
+              <a:ext uri="{FF2B5EF4-FFF2-40B4-BE49-F238E27FC236}">
+                <a16:creationId xmlns:a16="http://schemas.microsoft.com/office/drawing/2014/main" id="{92C52C11-E71D-F1C3-A68C-E1C8EC798598}"/>
+              </a:ext>
+            </a:extLst>
+          </p:cNvPr>
+          <p:cNvCxnSpPr>
+            <a:cxnSpLocks/>
+          </p:cNvCxnSpPr>
+          <p:nvPr/>
+        </p:nvCxnSpPr>
+        <p:spPr>
+          <a:xfrm flipV="1">
+            <a:off x="4753832" y="2691121"/>
+            <a:ext cx="2469226" cy="559322"/>
+          </a:xfrm>
+          <a:prstGeom prst="straightConnector1">
+            <a:avLst/>
+          </a:prstGeom>
+          <a:ln w="22225">
+            <a:solidFill>
+              <a:srgbClr val="FF0000"/>
+            </a:solidFill>
+            <a:headEnd type="none" w="lg" len="lg"/>
+            <a:tailEnd type="triangle" w="lg" len="lg"/>
+          </a:ln>
+        </p:spPr>
+        <p:style>
+          <a:lnRef idx="1">
+            <a:schemeClr val="accent1"/>
+          </a:lnRef>
+          <a:fillRef idx="0">
+            <a:schemeClr val="accent1"/>
+          </a:fillRef>
+          <a:effectRef idx="0">
+            <a:schemeClr val="accent1"/>
+          </a:effectRef>
+          <a:fontRef idx="minor">
+            <a:schemeClr val="tx1"/>
+          </a:fontRef>
+        </p:style>
+      </p:cxnSp>
+      <p:cxnSp>
+        <p:nvCxnSpPr>
+          <p:cNvPr id="40" name="Straight Arrow Connector 39">
+            <a:extLst>
+              <a:ext uri="{FF2B5EF4-FFF2-40B4-BE49-F238E27FC236}">
+                <a16:creationId xmlns:a16="http://schemas.microsoft.com/office/drawing/2014/main" id="{C5D6C03E-FB57-6A55-F36E-701A2E3CC8E2}"/>
+              </a:ext>
+            </a:extLst>
+          </p:cNvPr>
+          <p:cNvCxnSpPr>
+            <a:cxnSpLocks/>
+          </p:cNvCxnSpPr>
+          <p:nvPr/>
+        </p:nvCxnSpPr>
+        <p:spPr>
+          <a:xfrm flipV="1">
+            <a:off x="7204883" y="1903774"/>
+            <a:ext cx="1993710" cy="789620"/>
+          </a:xfrm>
+          <a:prstGeom prst="straightConnector1">
+            <a:avLst/>
+          </a:prstGeom>
+          <a:ln w="22225">
+            <a:solidFill>
+              <a:srgbClr val="7030A0"/>
+            </a:solidFill>
+            <a:headEnd type="none" w="lg" len="lg"/>
+            <a:tailEnd type="triangle" w="lg" len="lg"/>
+          </a:ln>
+        </p:spPr>
+        <p:style>
+          <a:lnRef idx="1">
+            <a:schemeClr val="accent1"/>
+          </a:lnRef>
+          <a:fillRef idx="0">
+            <a:schemeClr val="accent1"/>
+          </a:fillRef>
+          <a:effectRef idx="0">
+            <a:schemeClr val="accent1"/>
+          </a:effectRef>
+          <a:fontRef idx="minor">
+            <a:schemeClr val="tx1"/>
+          </a:fontRef>
+        </p:style>
+      </p:cxnSp>
+      <p:cxnSp>
+        <p:nvCxnSpPr>
+          <p:cNvPr id="42" name="Straight Arrow Connector 41">
+            <a:extLst>
+              <a:ext uri="{FF2B5EF4-FFF2-40B4-BE49-F238E27FC236}">
+                <a16:creationId xmlns:a16="http://schemas.microsoft.com/office/drawing/2014/main" id="{40072D22-9A0A-D31A-78CC-CC8184FFE37B}"/>
+              </a:ext>
+            </a:extLst>
+          </p:cNvPr>
+          <p:cNvCxnSpPr>
+            <a:cxnSpLocks/>
+          </p:cNvCxnSpPr>
+          <p:nvPr/>
+        </p:nvCxnSpPr>
+        <p:spPr>
+          <a:xfrm flipH="1" flipV="1">
+            <a:off x="3016159" y="2106301"/>
+            <a:ext cx="1685580" cy="1173706"/>
+          </a:xfrm>
+          <a:prstGeom prst="straightConnector1">
+            <a:avLst/>
+          </a:prstGeom>
+          <a:ln w="22225">
+            <a:solidFill>
+              <a:srgbClr val="00B050"/>
+            </a:solidFill>
+            <a:headEnd type="none" w="lg" len="lg"/>
+            <a:tailEnd type="triangle" w="lg" len="lg"/>
+          </a:ln>
+        </p:spPr>
+        <p:style>
+          <a:lnRef idx="1">
+            <a:schemeClr val="accent1"/>
+          </a:lnRef>
+          <a:fillRef idx="0">
+            <a:schemeClr val="accent1"/>
+          </a:fillRef>
+          <a:effectRef idx="0">
+            <a:schemeClr val="accent1"/>
+          </a:effectRef>
+          <a:fontRef idx="minor">
+            <a:schemeClr val="tx1"/>
+          </a:fontRef>
+        </p:style>
+      </p:cxnSp>
+      <p:sp>
+        <p:nvSpPr>
+          <p:cNvPr id="43" name="TextBox 42">
+            <a:extLst>
+              <a:ext uri="{FF2B5EF4-FFF2-40B4-BE49-F238E27FC236}">
+                <a16:creationId xmlns:a16="http://schemas.microsoft.com/office/drawing/2014/main" id="{5BC26D5A-72FD-BFB5-316F-FFA1B0FB4A37}"/>
+              </a:ext>
+            </a:extLst>
+          </p:cNvPr>
+          <p:cNvSpPr txBox="1"/>
+          <p:nvPr/>
+        </p:nvSpPr>
+        <p:spPr>
+          <a:xfrm>
+            <a:off x="3152636" y="3060453"/>
+            <a:ext cx="1594411" cy="369332"/>
+          </a:xfrm>
+          <a:prstGeom prst="rect">
+            <a:avLst/>
+          </a:prstGeom>
+          <a:noFill/>
+        </p:spPr>
+        <p:txBody>
+          <a:bodyPr wrap="none" rtlCol="0">
+            <a:spAutoFit/>
+          </a:bodyPr>
+          <a:lstStyle/>
+          <a:p>
+            <a:r>
+              <a:rPr lang="en-GB" dirty="0">
+                <a:solidFill>
+                  <a:srgbClr val="00B050"/>
+                </a:solidFill>
+              </a:rPr>
+              <a:t>Reflectance (R)</a:t>
+            </a:r>
+          </a:p>
+        </p:txBody>
+      </p:sp>
+      <p:sp>
+        <p:nvSpPr>
+          <p:cNvPr id="44" name="TextBox 43">
+            <a:extLst>
+              <a:ext uri="{FF2B5EF4-FFF2-40B4-BE49-F238E27FC236}">
+                <a16:creationId xmlns:a16="http://schemas.microsoft.com/office/drawing/2014/main" id="{F6B85F4A-DAD1-D318-2AC6-8DB2E1EA82B6}"/>
+              </a:ext>
+            </a:extLst>
+          </p:cNvPr>
+          <p:cNvSpPr txBox="1"/>
+          <p:nvPr/>
+        </p:nvSpPr>
+        <p:spPr>
+          <a:xfrm>
+            <a:off x="5408212" y="3036834"/>
+            <a:ext cx="1697709" cy="369332"/>
+          </a:xfrm>
+          <a:prstGeom prst="rect">
+            <a:avLst/>
+          </a:prstGeom>
+          <a:noFill/>
+        </p:spPr>
+        <p:txBody>
+          <a:bodyPr wrap="none" rtlCol="0">
+            <a:spAutoFit/>
+          </a:bodyPr>
+          <a:lstStyle/>
+          <a:p>
+            <a:r>
+              <a:rPr lang="en-GB" dirty="0" err="1">
+                <a:solidFill>
+                  <a:srgbClr val="FF0000"/>
+                </a:solidFill>
+              </a:rPr>
+              <a:t>Absorbtance</a:t>
+            </a:r>
+            <a:r>
+              <a:rPr lang="en-GB" dirty="0">
+                <a:solidFill>
+                  <a:srgbClr val="FF0000"/>
+                </a:solidFill>
+              </a:rPr>
+              <a:t> (A)</a:t>
+            </a:r>
+          </a:p>
+        </p:txBody>
+      </p:sp>
+    </p:spTree>
+    <p:extLst>
+      <p:ext uri="{BB962C8B-B14F-4D97-AF65-F5344CB8AC3E}">
+        <p14:creationId xmlns:p14="http://schemas.microsoft.com/office/powerpoint/2010/main" val="903926455"/>
+      </p:ext>
+    </p:extLst>
+  </p:cSld>
+  <p:clrMapOvr>
+    <a:masterClrMapping/>
+  </p:clrMapOvr>
+</p:sld>
+</file>
+
 <file path=ppt/theme/theme1.xml><?xml version="1.0" encoding="utf-8"?>
 <a:theme xmlns:a="http://schemas.openxmlformats.org/drawingml/2006/main" name="Office Theme">
   <a:themeElements>

</xml_diff>